<commit_message>
ready for initial load :wq
</commit_message>
<xml_diff>
--- a/working.pptx
+++ b/working.pptx
@@ -11,6 +11,9 @@
     <p:sldId id="259" r:id="rId5"/>
     <p:sldId id="260" r:id="rId6"/>
     <p:sldId id="261" r:id="rId7"/>
+    <p:sldId id="262" r:id="rId8"/>
+    <p:sldId id="263" r:id="rId9"/>
+    <p:sldId id="264" r:id="rId10"/>
   </p:sldIdLst>
   <p:sldSz cx="12192000" cy="6858000"/>
   <p:notesSz cx="6858000" cy="9144000"/>
@@ -246,7 +249,7 @@
           <a:p>
             <a:fld id="{9C5DBD3B-9086-4BE7-A923-CBABB5F55031}" type="datetimeFigureOut">
               <a:rPr lang="en-US" smtClean="0"/>
-              <a:t>3/17/2017</a:t>
+              <a:t>3/29/2017</a:t>
             </a:fld>
             <a:endParaRPr lang="en-US"/>
           </a:p>
@@ -414,7 +417,7 @@
           <a:p>
             <a:fld id="{9C5DBD3B-9086-4BE7-A923-CBABB5F55031}" type="datetimeFigureOut">
               <a:rPr lang="en-US" smtClean="0"/>
-              <a:t>3/17/2017</a:t>
+              <a:t>3/29/2017</a:t>
             </a:fld>
             <a:endParaRPr lang="en-US"/>
           </a:p>
@@ -592,7 +595,7 @@
           <a:p>
             <a:fld id="{9C5DBD3B-9086-4BE7-A923-CBABB5F55031}" type="datetimeFigureOut">
               <a:rPr lang="en-US" smtClean="0"/>
-              <a:t>3/17/2017</a:t>
+              <a:t>3/29/2017</a:t>
             </a:fld>
             <a:endParaRPr lang="en-US"/>
           </a:p>
@@ -760,7 +763,7 @@
           <a:p>
             <a:fld id="{9C5DBD3B-9086-4BE7-A923-CBABB5F55031}" type="datetimeFigureOut">
               <a:rPr lang="en-US" smtClean="0"/>
-              <a:t>3/17/2017</a:t>
+              <a:t>3/29/2017</a:t>
             </a:fld>
             <a:endParaRPr lang="en-US"/>
           </a:p>
@@ -1005,7 +1008,7 @@
           <a:p>
             <a:fld id="{9C5DBD3B-9086-4BE7-A923-CBABB5F55031}" type="datetimeFigureOut">
               <a:rPr lang="en-US" smtClean="0"/>
-              <a:t>3/17/2017</a:t>
+              <a:t>3/29/2017</a:t>
             </a:fld>
             <a:endParaRPr lang="en-US"/>
           </a:p>
@@ -1234,7 +1237,7 @@
           <a:p>
             <a:fld id="{9C5DBD3B-9086-4BE7-A923-CBABB5F55031}" type="datetimeFigureOut">
               <a:rPr lang="en-US" smtClean="0"/>
-              <a:t>3/17/2017</a:t>
+              <a:t>3/29/2017</a:t>
             </a:fld>
             <a:endParaRPr lang="en-US"/>
           </a:p>
@@ -1598,7 +1601,7 @@
           <a:p>
             <a:fld id="{9C5DBD3B-9086-4BE7-A923-CBABB5F55031}" type="datetimeFigureOut">
               <a:rPr lang="en-US" smtClean="0"/>
-              <a:t>3/17/2017</a:t>
+              <a:t>3/29/2017</a:t>
             </a:fld>
             <a:endParaRPr lang="en-US"/>
           </a:p>
@@ -1715,7 +1718,7 @@
           <a:p>
             <a:fld id="{9C5DBD3B-9086-4BE7-A923-CBABB5F55031}" type="datetimeFigureOut">
               <a:rPr lang="en-US" smtClean="0"/>
-              <a:t>3/17/2017</a:t>
+              <a:t>3/29/2017</a:t>
             </a:fld>
             <a:endParaRPr lang="en-US"/>
           </a:p>
@@ -1810,7 +1813,7 @@
           <a:p>
             <a:fld id="{9C5DBD3B-9086-4BE7-A923-CBABB5F55031}" type="datetimeFigureOut">
               <a:rPr lang="en-US" smtClean="0"/>
-              <a:t>3/17/2017</a:t>
+              <a:t>3/29/2017</a:t>
             </a:fld>
             <a:endParaRPr lang="en-US"/>
           </a:p>
@@ -2085,7 +2088,7 @@
           <a:p>
             <a:fld id="{9C5DBD3B-9086-4BE7-A923-CBABB5F55031}" type="datetimeFigureOut">
               <a:rPr lang="en-US" smtClean="0"/>
-              <a:t>3/17/2017</a:t>
+              <a:t>3/29/2017</a:t>
             </a:fld>
             <a:endParaRPr lang="en-US"/>
           </a:p>
@@ -2337,7 +2340,7 @@
           <a:p>
             <a:fld id="{9C5DBD3B-9086-4BE7-A923-CBABB5F55031}" type="datetimeFigureOut">
               <a:rPr lang="en-US" smtClean="0"/>
-              <a:t>3/17/2017</a:t>
+              <a:t>3/29/2017</a:t>
             </a:fld>
             <a:endParaRPr lang="en-US"/>
           </a:p>
@@ -2548,7 +2551,7 @@
           <a:p>
             <a:fld id="{9C5DBD3B-9086-4BE7-A923-CBABB5F55031}" type="datetimeFigureOut">
               <a:rPr lang="en-US" smtClean="0"/>
-              <a:t>3/17/2017</a:t>
+              <a:t>3/29/2017</a:t>
             </a:fld>
             <a:endParaRPr lang="en-US"/>
           </a:p>
@@ -3563,6 +3566,30 @@
           </a:p>
         </p:txBody>
       </p:sp>
+      <p:pic>
+        <p:nvPicPr>
+          <p:cNvPr id="6" name="Picture 5"/>
+          <p:cNvPicPr>
+            <a:picLocks noChangeAspect="1"/>
+          </p:cNvPicPr>
+          <p:nvPr/>
+        </p:nvPicPr>
+        <p:blipFill>
+          <a:blip r:embed="rId2"/>
+          <a:stretch>
+            <a:fillRect/>
+          </a:stretch>
+        </p:blipFill>
+        <p:spPr>
+          <a:xfrm>
+            <a:off x="5439586" y="1856300"/>
+            <a:ext cx="5962650" cy="4324350"/>
+          </a:xfrm>
+          <a:prstGeom prst="rect">
+            <a:avLst/>
+          </a:prstGeom>
+        </p:spPr>
+      </p:pic>
     </p:spTree>
     <p:extLst>
       <p:ext uri="{BB962C8B-B14F-4D97-AF65-F5344CB8AC3E}">
@@ -3593,10 +3620,368 @@
           <a:chExt cx="0" cy="0"/>
         </a:xfrm>
       </p:grpSpPr>
+      <p:pic>
+        <p:nvPicPr>
+          <p:cNvPr id="2" name="Picture 1"/>
+          <p:cNvPicPr>
+            <a:picLocks noChangeAspect="1"/>
+          </p:cNvPicPr>
+          <p:nvPr/>
+        </p:nvPicPr>
+        <p:blipFill>
+          <a:blip r:embed="rId2"/>
+          <a:stretch>
+            <a:fillRect/>
+          </a:stretch>
+        </p:blipFill>
+        <p:spPr>
+          <a:xfrm>
+            <a:off x="1076933" y="257377"/>
+            <a:ext cx="4610100" cy="6362700"/>
+          </a:xfrm>
+          <a:prstGeom prst="rect">
+            <a:avLst/>
+          </a:prstGeom>
+        </p:spPr>
+      </p:pic>
+      <p:grpSp>
+        <p:nvGrpSpPr>
+          <p:cNvPr id="5" name="Group 4"/>
+          <p:cNvGrpSpPr/>
+          <p:nvPr/>
+        </p:nvGrpSpPr>
+        <p:grpSpPr>
+          <a:xfrm>
+            <a:off x="6349324" y="679833"/>
+            <a:ext cx="5272391" cy="3036134"/>
+            <a:chOff x="6349324" y="679833"/>
+            <a:chExt cx="5272391" cy="3036134"/>
+          </a:xfrm>
+        </p:grpSpPr>
+        <p:pic>
+          <p:nvPicPr>
+            <p:cNvPr id="3" name="Picture 2"/>
+            <p:cNvPicPr>
+              <a:picLocks noChangeAspect="1"/>
+            </p:cNvPicPr>
+            <p:nvPr/>
+          </p:nvPicPr>
+          <p:blipFill>
+            <a:blip r:embed="rId3"/>
+            <a:stretch>
+              <a:fillRect/>
+            </a:stretch>
+          </p:blipFill>
+          <p:spPr>
+            <a:xfrm>
+              <a:off x="6349324" y="679833"/>
+              <a:ext cx="4610100" cy="2758894"/>
+            </a:xfrm>
+            <a:prstGeom prst="rect">
+              <a:avLst/>
+            </a:prstGeom>
+          </p:spPr>
+        </p:pic>
+        <p:sp>
+          <p:nvSpPr>
+            <p:cNvPr id="4" name="Speech Bubble: Rectangle 3"/>
+            <p:cNvSpPr/>
+            <p:nvPr/>
+          </p:nvSpPr>
+          <p:spPr>
+            <a:xfrm>
+              <a:off x="7925204" y="2996119"/>
+              <a:ext cx="3696511" cy="719848"/>
+            </a:xfrm>
+            <a:prstGeom prst="wedgeRectCallout">
+              <a:avLst>
+                <a:gd name="adj1" fmla="val -50043"/>
+                <a:gd name="adj2" fmla="val -176372"/>
+              </a:avLst>
+            </a:prstGeom>
+          </p:spPr>
+          <p:style>
+            <a:lnRef idx="2">
+              <a:schemeClr val="accent1">
+                <a:shade val="50000"/>
+              </a:schemeClr>
+            </a:lnRef>
+            <a:fillRef idx="1">
+              <a:schemeClr val="accent1"/>
+            </a:fillRef>
+            <a:effectRef idx="0">
+              <a:schemeClr val="accent1"/>
+            </a:effectRef>
+            <a:fontRef idx="minor">
+              <a:schemeClr val="lt1"/>
+            </a:fontRef>
+          </p:style>
+          <p:txBody>
+            <a:bodyPr rtlCol="0" anchor="ctr"/>
+            <a:lstStyle/>
+            <a:p>
+              <a:pPr algn="ctr"/>
+              <a:r>
+                <a:rPr lang="en-US" sz="3200" dirty="0"/>
+                <a:t>Mobile Rendering</a:t>
+              </a:r>
+            </a:p>
+          </p:txBody>
+        </p:sp>
+      </p:grpSp>
     </p:spTree>
     <p:extLst>
       <p:ext uri="{BB962C8B-B14F-4D97-AF65-F5344CB8AC3E}">
         <p14:creationId xmlns:p14="http://schemas.microsoft.com/office/powerpoint/2010/main" val="1170720004"/>
+      </p:ext>
+    </p:extLst>
+  </p:cSld>
+  <p:clrMapOvr>
+    <a:masterClrMapping/>
+  </p:clrMapOvr>
+</p:sld>
+</file>
+
+<file path=ppt/slides/slide7.xml><?xml version="1.0" encoding="utf-8"?>
+<p:sld xmlns:a="http://schemas.openxmlformats.org/drawingml/2006/main" xmlns:r="http://schemas.openxmlformats.org/officeDocument/2006/relationships" xmlns:p="http://schemas.openxmlformats.org/presentationml/2006/main">
+  <p:cSld>
+    <p:spTree>
+      <p:nvGrpSpPr>
+        <p:cNvPr id="1" name=""/>
+        <p:cNvGrpSpPr/>
+        <p:nvPr/>
+      </p:nvGrpSpPr>
+      <p:grpSpPr>
+        <a:xfrm>
+          <a:off x="0" y="0"/>
+          <a:ext cx="0" cy="0"/>
+          <a:chOff x="0" y="0"/>
+          <a:chExt cx="0" cy="0"/>
+        </a:xfrm>
+      </p:grpSpPr>
+      <p:grpSp>
+        <p:nvGrpSpPr>
+          <p:cNvPr id="5" name="Group 4"/>
+          <p:cNvGrpSpPr/>
+          <p:nvPr/>
+        </p:nvGrpSpPr>
+        <p:grpSpPr>
+          <a:xfrm>
+            <a:off x="588813" y="600886"/>
+            <a:ext cx="3547014" cy="2119895"/>
+            <a:chOff x="588813" y="600886"/>
+            <a:chExt cx="3547014" cy="2119895"/>
+          </a:xfrm>
+        </p:grpSpPr>
+        <p:pic>
+          <p:nvPicPr>
+            <p:cNvPr id="2" name="Picture 1"/>
+            <p:cNvPicPr>
+              <a:picLocks noChangeAspect="1"/>
+            </p:cNvPicPr>
+            <p:nvPr/>
+          </p:nvPicPr>
+          <p:blipFill>
+            <a:blip r:embed="rId2"/>
+            <a:stretch>
+              <a:fillRect/>
+            </a:stretch>
+          </p:blipFill>
+          <p:spPr>
+            <a:xfrm>
+              <a:off x="588813" y="600886"/>
+              <a:ext cx="2846484" cy="1256252"/>
+            </a:xfrm>
+            <a:prstGeom prst="rect">
+              <a:avLst/>
+            </a:prstGeom>
+          </p:spPr>
+        </p:pic>
+        <p:pic>
+          <p:nvPicPr>
+            <p:cNvPr id="3" name="Picture 2"/>
+            <p:cNvPicPr>
+              <a:picLocks noChangeAspect="1"/>
+            </p:cNvPicPr>
+            <p:nvPr/>
+          </p:nvPicPr>
+          <p:blipFill>
+            <a:blip r:embed="rId3"/>
+            <a:stretch>
+              <a:fillRect/>
+            </a:stretch>
+          </p:blipFill>
+          <p:spPr>
+            <a:xfrm>
+              <a:off x="1934234" y="836090"/>
+              <a:ext cx="2201593" cy="1649174"/>
+            </a:xfrm>
+            <a:prstGeom prst="rect">
+              <a:avLst/>
+            </a:prstGeom>
+          </p:spPr>
+        </p:pic>
+        <p:pic>
+          <p:nvPicPr>
+            <p:cNvPr id="4" name="Picture 3"/>
+            <p:cNvPicPr>
+              <a:picLocks noChangeAspect="1"/>
+            </p:cNvPicPr>
+            <p:nvPr/>
+          </p:nvPicPr>
+          <p:blipFill>
+            <a:blip r:embed="rId4"/>
+            <a:stretch>
+              <a:fillRect/>
+            </a:stretch>
+          </p:blipFill>
+          <p:spPr>
+            <a:xfrm>
+              <a:off x="860332" y="1488332"/>
+              <a:ext cx="2592291" cy="1232449"/>
+            </a:xfrm>
+            <a:prstGeom prst="rect">
+              <a:avLst/>
+            </a:prstGeom>
+          </p:spPr>
+        </p:pic>
+      </p:grpSp>
+      <p:pic>
+        <p:nvPicPr>
+          <p:cNvPr id="6" name="Picture 5"/>
+          <p:cNvPicPr>
+            <a:picLocks noChangeAspect="1"/>
+          </p:cNvPicPr>
+          <p:nvPr/>
+        </p:nvPicPr>
+        <p:blipFill>
+          <a:blip r:embed="rId5"/>
+          <a:stretch>
+            <a:fillRect/>
+          </a:stretch>
+        </p:blipFill>
+        <p:spPr>
+          <a:xfrm>
+            <a:off x="2493422" y="3947809"/>
+            <a:ext cx="9286875" cy="2133600"/>
+          </a:xfrm>
+          <a:prstGeom prst="rect">
+            <a:avLst/>
+          </a:prstGeom>
+        </p:spPr>
+      </p:pic>
+    </p:spTree>
+    <p:extLst>
+      <p:ext uri="{BB962C8B-B14F-4D97-AF65-F5344CB8AC3E}">
+        <p14:creationId xmlns:p14="http://schemas.microsoft.com/office/powerpoint/2010/main" val="4182109157"/>
+      </p:ext>
+    </p:extLst>
+  </p:cSld>
+  <p:clrMapOvr>
+    <a:masterClrMapping/>
+  </p:clrMapOvr>
+</p:sld>
+</file>
+
+<file path=ppt/slides/slide8.xml><?xml version="1.0" encoding="utf-8"?>
+<p:sld xmlns:a="http://schemas.openxmlformats.org/drawingml/2006/main" xmlns:r="http://schemas.openxmlformats.org/officeDocument/2006/relationships" xmlns:p="http://schemas.openxmlformats.org/presentationml/2006/main">
+  <p:cSld>
+    <p:spTree>
+      <p:nvGrpSpPr>
+        <p:cNvPr id="1" name=""/>
+        <p:cNvGrpSpPr/>
+        <p:nvPr/>
+      </p:nvGrpSpPr>
+      <p:grpSpPr>
+        <a:xfrm>
+          <a:off x="0" y="0"/>
+          <a:ext cx="0" cy="0"/>
+          <a:chOff x="0" y="0"/>
+          <a:chExt cx="0" cy="0"/>
+        </a:xfrm>
+      </p:grpSpPr>
+      <p:pic>
+        <p:nvPicPr>
+          <p:cNvPr id="2" name="Picture 1"/>
+          <p:cNvPicPr>
+            <a:picLocks noChangeAspect="1"/>
+          </p:cNvPicPr>
+          <p:nvPr/>
+        </p:nvPicPr>
+        <p:blipFill>
+          <a:blip r:embed="rId2"/>
+          <a:stretch>
+            <a:fillRect/>
+          </a:stretch>
+        </p:blipFill>
+        <p:spPr>
+          <a:xfrm>
+            <a:off x="570790" y="244306"/>
+            <a:ext cx="6867525" cy="4676775"/>
+          </a:xfrm>
+          <a:prstGeom prst="rect">
+            <a:avLst/>
+          </a:prstGeom>
+        </p:spPr>
+      </p:pic>
+    </p:spTree>
+    <p:extLst>
+      <p:ext uri="{BB962C8B-B14F-4D97-AF65-F5344CB8AC3E}">
+        <p14:creationId xmlns:p14="http://schemas.microsoft.com/office/powerpoint/2010/main" val="2040038149"/>
+      </p:ext>
+    </p:extLst>
+  </p:cSld>
+  <p:clrMapOvr>
+    <a:masterClrMapping/>
+  </p:clrMapOvr>
+</p:sld>
+</file>
+
+<file path=ppt/slides/slide9.xml><?xml version="1.0" encoding="utf-8"?>
+<p:sld xmlns:a="http://schemas.openxmlformats.org/drawingml/2006/main" xmlns:r="http://schemas.openxmlformats.org/officeDocument/2006/relationships" xmlns:p="http://schemas.openxmlformats.org/presentationml/2006/main">
+  <p:cSld>
+    <p:spTree>
+      <p:nvGrpSpPr>
+        <p:cNvPr id="1" name=""/>
+        <p:cNvGrpSpPr/>
+        <p:nvPr/>
+      </p:nvGrpSpPr>
+      <p:grpSpPr>
+        <a:xfrm>
+          <a:off x="0" y="0"/>
+          <a:ext cx="0" cy="0"/>
+          <a:chOff x="0" y="0"/>
+          <a:chExt cx="0" cy="0"/>
+        </a:xfrm>
+      </p:grpSpPr>
+      <p:pic>
+        <p:nvPicPr>
+          <p:cNvPr id="2" name="Picture 1"/>
+          <p:cNvPicPr>
+            <a:picLocks noChangeAspect="1"/>
+          </p:cNvPicPr>
+          <p:nvPr/>
+        </p:nvPicPr>
+        <p:blipFill>
+          <a:blip r:embed="rId2"/>
+          <a:stretch>
+            <a:fillRect/>
+          </a:stretch>
+        </p:blipFill>
+        <p:spPr>
+          <a:xfrm>
+            <a:off x="3324225" y="128587"/>
+            <a:ext cx="5543550" cy="6600825"/>
+          </a:xfrm>
+          <a:prstGeom prst="rect">
+            <a:avLst/>
+          </a:prstGeom>
+        </p:spPr>
+      </p:pic>
+    </p:spTree>
+    <p:extLst>
+      <p:ext uri="{BB962C8B-B14F-4D97-AF65-F5344CB8AC3E}">
+        <p14:creationId xmlns:p14="http://schemas.microsoft.com/office/powerpoint/2010/main" val="232962691"/>
       </p:ext>
     </p:extLst>
   </p:cSld>

</xml_diff>